<commit_message>
add CopyIniPatternToEachFolder add FindSpecFileExtention_SpecIni
# 1.get specfic ini name and path from [FindSpecFileExtention_SpecIni]
# 2.copy ini template to each folder
# 3.update ini item Config_Type for each file
</commit_message>
<xml_diff>
--- a/py_file.pptx
+++ b/py_file.pptx
@@ -5,7 +5,7 @@
     <p:sldMasterId id="2147483648" r:id="rId1"/>
   </p:sldMasterIdLst>
   <p:notesMasterIdLst>
-    <p:notesMasterId r:id="rId11"/>
+    <p:notesMasterId r:id="rId12"/>
   </p:notesMasterIdLst>
   <p:sldIdLst>
     <p:sldId id="257" r:id="rId2"/>
@@ -17,6 +17,7 @@
     <p:sldId id="267" r:id="rId8"/>
     <p:sldId id="269" r:id="rId9"/>
     <p:sldId id="270" r:id="rId10"/>
+    <p:sldId id="271" r:id="rId11"/>
   </p:sldIdLst>
   <p:sldSz cx="12192000" cy="6858000"/>
   <p:notesSz cx="6858000" cy="9144000"/>
@@ -209,7 +210,7 @@
           <a:p>
             <a:fld id="{31028575-352C-46D8-B492-B571E87FA056}" type="datetimeFigureOut">
               <a:rPr lang="en-US" smtClean="0"/>
-              <a:t>9/9/2020</a:t>
+              <a:t>9/10/2020</a:t>
             </a:fld>
             <a:endParaRPr lang="en-US"/>
           </a:p>
@@ -692,7 +693,7 @@
           <a:p>
             <a:fld id="{FD47002F-F9B5-4A5E-A203-D8A540F0CB5B}" type="datetimeFigureOut">
               <a:rPr lang="en-US" smtClean="0"/>
-              <a:t>9/9/2020</a:t>
+              <a:t>9/10/2020</a:t>
             </a:fld>
             <a:endParaRPr lang="en-US"/>
           </a:p>
@@ -860,7 +861,7 @@
           <a:p>
             <a:fld id="{FD47002F-F9B5-4A5E-A203-D8A540F0CB5B}" type="datetimeFigureOut">
               <a:rPr lang="en-US" smtClean="0"/>
-              <a:t>9/9/2020</a:t>
+              <a:t>9/10/2020</a:t>
             </a:fld>
             <a:endParaRPr lang="en-US"/>
           </a:p>
@@ -1038,7 +1039,7 @@
           <a:p>
             <a:fld id="{FD47002F-F9B5-4A5E-A203-D8A540F0CB5B}" type="datetimeFigureOut">
               <a:rPr lang="en-US" smtClean="0"/>
-              <a:t>9/9/2020</a:t>
+              <a:t>9/10/2020</a:t>
             </a:fld>
             <a:endParaRPr lang="en-US"/>
           </a:p>
@@ -1206,7 +1207,7 @@
           <a:p>
             <a:fld id="{FD47002F-F9B5-4A5E-A203-D8A540F0CB5B}" type="datetimeFigureOut">
               <a:rPr lang="en-US" smtClean="0"/>
-              <a:t>9/9/2020</a:t>
+              <a:t>9/10/2020</a:t>
             </a:fld>
             <a:endParaRPr lang="en-US"/>
           </a:p>
@@ -1451,7 +1452,7 @@
           <a:p>
             <a:fld id="{FD47002F-F9B5-4A5E-A203-D8A540F0CB5B}" type="datetimeFigureOut">
               <a:rPr lang="en-US" smtClean="0"/>
-              <a:t>9/9/2020</a:t>
+              <a:t>9/10/2020</a:t>
             </a:fld>
             <a:endParaRPr lang="en-US"/>
           </a:p>
@@ -1680,7 +1681,7 @@
           <a:p>
             <a:fld id="{FD47002F-F9B5-4A5E-A203-D8A540F0CB5B}" type="datetimeFigureOut">
               <a:rPr lang="en-US" smtClean="0"/>
-              <a:t>9/9/2020</a:t>
+              <a:t>9/10/2020</a:t>
             </a:fld>
             <a:endParaRPr lang="en-US"/>
           </a:p>
@@ -2044,7 +2045,7 @@
           <a:p>
             <a:fld id="{FD47002F-F9B5-4A5E-A203-D8A540F0CB5B}" type="datetimeFigureOut">
               <a:rPr lang="en-US" smtClean="0"/>
-              <a:t>9/9/2020</a:t>
+              <a:t>9/10/2020</a:t>
             </a:fld>
             <a:endParaRPr lang="en-US"/>
           </a:p>
@@ -2161,7 +2162,7 @@
           <a:p>
             <a:fld id="{FD47002F-F9B5-4A5E-A203-D8A540F0CB5B}" type="datetimeFigureOut">
               <a:rPr lang="en-US" smtClean="0"/>
-              <a:t>9/9/2020</a:t>
+              <a:t>9/10/2020</a:t>
             </a:fld>
             <a:endParaRPr lang="en-US"/>
           </a:p>
@@ -2256,7 +2257,7 @@
           <a:p>
             <a:fld id="{FD47002F-F9B5-4A5E-A203-D8A540F0CB5B}" type="datetimeFigureOut">
               <a:rPr lang="en-US" smtClean="0"/>
-              <a:t>9/9/2020</a:t>
+              <a:t>9/10/2020</a:t>
             </a:fld>
             <a:endParaRPr lang="en-US"/>
           </a:p>
@@ -2531,7 +2532,7 @@
           <a:p>
             <a:fld id="{FD47002F-F9B5-4A5E-A203-D8A540F0CB5B}" type="datetimeFigureOut">
               <a:rPr lang="en-US" smtClean="0"/>
-              <a:t>9/9/2020</a:t>
+              <a:t>9/10/2020</a:t>
             </a:fld>
             <a:endParaRPr lang="en-US"/>
           </a:p>
@@ -2783,7 +2784,7 @@
           <a:p>
             <a:fld id="{FD47002F-F9B5-4A5E-A203-D8A540F0CB5B}" type="datetimeFigureOut">
               <a:rPr lang="en-US" smtClean="0"/>
-              <a:t>9/9/2020</a:t>
+              <a:t>9/10/2020</a:t>
             </a:fld>
             <a:endParaRPr lang="en-US"/>
           </a:p>
@@ -2994,7 +2995,7 @@
           <a:p>
             <a:fld id="{FD47002F-F9B5-4A5E-A203-D8A540F0CB5B}" type="datetimeFigureOut">
               <a:rPr lang="en-US" smtClean="0"/>
-              <a:t>9/9/2020</a:t>
+              <a:t>9/10/2020</a:t>
             </a:fld>
             <a:endParaRPr lang="en-US"/>
           </a:p>
@@ -10387,7 +10388,7 @@
                 <a:latin typeface="Arial" panose="020B0604020202020204" pitchFamily="34" charset="0"/>
                 <a:cs typeface="Arial" panose="020B0604020202020204" pitchFamily="34" charset="0"/>
               </a:rPr>
-              <a:t>Wednesday, September 9, 2020</a:t>
+              <a:t>Thursday, September 10, 2020</a:t>
             </a:fld>
             <a:endParaRPr lang="en-US" dirty="0">
               <a:solidFill>
@@ -10445,6 +10446,353 @@
       </p:transition>
     </mc:Fallback>
   </mc:AlternateContent>
+</p:sld>
+</file>
+
+<file path=ppt/slides/slide10.xml><?xml version="1.0" encoding="utf-8"?>
+<p:sld xmlns:a="http://schemas.openxmlformats.org/drawingml/2006/main" xmlns:r="http://schemas.openxmlformats.org/officeDocument/2006/relationships" xmlns:p="http://schemas.openxmlformats.org/presentationml/2006/main">
+  <p:cSld>
+    <p:spTree>
+      <p:nvGrpSpPr>
+        <p:cNvPr id="1" name=""/>
+        <p:cNvGrpSpPr/>
+        <p:nvPr/>
+      </p:nvGrpSpPr>
+      <p:grpSpPr>
+        <a:xfrm>
+          <a:off x="0" y="0"/>
+          <a:ext cx="0" cy="0"/>
+          <a:chOff x="0" y="0"/>
+          <a:chExt cx="0" cy="0"/>
+        </a:xfrm>
+      </p:grpSpPr>
+      <p:pic>
+        <p:nvPicPr>
+          <p:cNvPr id="3" name="圖片 2"/>
+          <p:cNvPicPr>
+            <a:picLocks noChangeAspect="1"/>
+          </p:cNvPicPr>
+          <p:nvPr/>
+        </p:nvPicPr>
+        <p:blipFill>
+          <a:blip r:embed="rId3"/>
+          <a:stretch>
+            <a:fillRect/>
+          </a:stretch>
+        </p:blipFill>
+        <p:spPr>
+          <a:xfrm>
+            <a:off x="164867" y="333720"/>
+            <a:ext cx="7488085" cy="585591"/>
+          </a:xfrm>
+          <a:prstGeom prst="rect">
+            <a:avLst/>
+          </a:prstGeom>
+        </p:spPr>
+      </p:pic>
+      <p:sp>
+        <p:nvSpPr>
+          <p:cNvPr id="4" name="矩形 3"/>
+          <p:cNvSpPr/>
+          <p:nvPr/>
+        </p:nvSpPr>
+        <p:spPr>
+          <a:xfrm>
+            <a:off x="82489" y="1385312"/>
+            <a:ext cx="11162160" cy="3693319"/>
+          </a:xfrm>
+          <a:prstGeom prst="rect">
+            <a:avLst/>
+          </a:prstGeom>
+        </p:spPr>
+        <p:txBody>
+          <a:bodyPr wrap="square">
+            <a:spAutoFit/>
+          </a:bodyPr>
+          <a:lstStyle/>
+          <a:p>
+            <a:pPr marL="342900" indent="-342900">
+              <a:buFont typeface="+mj-lt"/>
+              <a:buAutoNum type="arabicPeriod"/>
+            </a:pPr>
+            <a:r>
+              <a:rPr lang="zh-TW" altLang="en-US" dirty="0"/>
+              <a:t>FindSpecFileExtention</a:t>
+            </a:r>
+            <a:r>
+              <a:rPr lang="zh-TW" altLang="en-US" dirty="0" smtClean="0"/>
+              <a:t>_SpecIni</a:t>
+            </a:r>
+            <a:endParaRPr lang="en-US" altLang="zh-TW" dirty="0" smtClean="0"/>
+          </a:p>
+          <a:p>
+            <a:pPr marL="800100" lvl="1" indent="-342900">
+              <a:buFont typeface="Arial" panose="020B0604020202020204" pitchFamily="34" charset="0"/>
+              <a:buChar char="•"/>
+            </a:pPr>
+            <a:r>
+              <a:rPr lang="en-US" altLang="zh-TW" dirty="0" smtClean="0"/>
+              <a:t>Find </a:t>
+            </a:r>
+            <a:r>
+              <a:rPr lang="en-US" altLang="zh-TW" dirty="0" err="1" smtClean="0"/>
+              <a:t>ini</a:t>
+            </a:r>
+            <a:r>
+              <a:rPr lang="en-US" altLang="zh-TW" dirty="0"/>
+              <a:t> </a:t>
+            </a:r>
+            <a:r>
+              <a:rPr lang="en-US" altLang="zh-TW" dirty="0" smtClean="0"/>
+              <a:t>and get folder name</a:t>
+            </a:r>
+          </a:p>
+          <a:p>
+            <a:pPr marL="800100" lvl="1" indent="-342900">
+              <a:buFont typeface="Arial" panose="020B0604020202020204" pitchFamily="34" charset="0"/>
+              <a:buChar char="•"/>
+            </a:pPr>
+            <a:r>
+              <a:rPr lang="en-US" altLang="zh-TW" dirty="0" smtClean="0"/>
+              <a:t>Combine result as list, </a:t>
+            </a:r>
+            <a:r>
+              <a:rPr lang="en-US" altLang="zh-TW" dirty="0" err="1" smtClean="0"/>
+              <a:t>ini</a:t>
+            </a:r>
+            <a:r>
+              <a:rPr lang="en-US" altLang="zh-TW" dirty="0" smtClean="0"/>
+              <a:t> name, folder name, </a:t>
+            </a:r>
+            <a:r>
+              <a:rPr lang="en-US" altLang="zh-TW" dirty="0" err="1" smtClean="0"/>
+              <a:t>ini</a:t>
+            </a:r>
+            <a:r>
+              <a:rPr lang="en-US" altLang="zh-TW" dirty="0" smtClean="0"/>
+              <a:t> path</a:t>
+            </a:r>
+          </a:p>
+          <a:p>
+            <a:pPr marL="800100" lvl="1" indent="-342900">
+              <a:buFont typeface="Arial" panose="020B0604020202020204" pitchFamily="34" charset="0"/>
+              <a:buChar char="•"/>
+            </a:pPr>
+            <a:r>
+              <a:rPr lang="en-US" altLang="zh-TW" dirty="0"/>
+              <a:t>EX: 'SV5_512GB', 'Samsung', </a:t>
+            </a:r>
+            <a:r>
+              <a:rPr lang="en-US" altLang="zh-TW" dirty="0" smtClean="0"/>
+              <a:t>'</a:t>
+            </a:r>
+            <a:r>
+              <a:rPr lang="en-US" altLang="zh-TW" dirty="0" err="1" smtClean="0"/>
+              <a:t>Dpython_local_git</a:t>
+            </a:r>
+            <a:r>
+              <a:rPr lang="en-US" altLang="zh-TW" dirty="0"/>
+              <a:t>\\Bin\\Samsung\\SV5_32GB</a:t>
+            </a:r>
+            <a:r>
+              <a:rPr lang="en-US" altLang="zh-TW" dirty="0" smtClean="0"/>
+              <a:t>')</a:t>
+            </a:r>
+          </a:p>
+          <a:p>
+            <a:pPr marL="800100" lvl="1" indent="-342900">
+              <a:buFont typeface="Arial" panose="020B0604020202020204" pitchFamily="34" charset="0"/>
+              <a:buChar char="•"/>
+            </a:pPr>
+            <a:endParaRPr lang="en-US" altLang="zh-TW" dirty="0"/>
+          </a:p>
+          <a:p>
+            <a:pPr marL="800100" lvl="1" indent="-342900">
+              <a:buFont typeface="Arial" panose="020B0604020202020204" pitchFamily="34" charset="0"/>
+              <a:buChar char="•"/>
+            </a:pPr>
+            <a:endParaRPr lang="en-US" altLang="zh-TW" dirty="0" smtClean="0"/>
+          </a:p>
+          <a:p>
+            <a:pPr marL="800100" lvl="1" indent="-342900">
+              <a:buFont typeface="Arial" panose="020B0604020202020204" pitchFamily="34" charset="0"/>
+              <a:buChar char="•"/>
+            </a:pPr>
+            <a:endParaRPr lang="en-US" altLang="zh-TW" dirty="0"/>
+          </a:p>
+          <a:p>
+            <a:pPr marL="800100" lvl="1" indent="-342900">
+              <a:buFont typeface="Arial" panose="020B0604020202020204" pitchFamily="34" charset="0"/>
+              <a:buChar char="•"/>
+            </a:pPr>
+            <a:endParaRPr lang="en-US" altLang="zh-TW" dirty="0" smtClean="0"/>
+          </a:p>
+          <a:p>
+            <a:pPr marL="800100" lvl="1" indent="-342900">
+              <a:buFont typeface="Arial" panose="020B0604020202020204" pitchFamily="34" charset="0"/>
+              <a:buChar char="•"/>
+            </a:pPr>
+            <a:endParaRPr lang="en-US" altLang="zh-TW" dirty="0" smtClean="0"/>
+          </a:p>
+          <a:p>
+            <a:pPr marL="342900" indent="-342900">
+              <a:buFont typeface="+mj-lt"/>
+              <a:buAutoNum type="arabicPeriod"/>
+            </a:pPr>
+            <a:r>
+              <a:rPr lang="en-US" altLang="zh-TW" dirty="0" err="1" smtClean="0"/>
+              <a:t>CopyIniPatternToEachFolder</a:t>
+            </a:r>
+            <a:endParaRPr lang="en-US" altLang="zh-TW" dirty="0" smtClean="0"/>
+          </a:p>
+          <a:p>
+            <a:pPr marL="800100" lvl="1" indent="-342900">
+              <a:buFont typeface="Arial" panose="020B0604020202020204" pitchFamily="34" charset="0"/>
+              <a:buChar char="•"/>
+            </a:pPr>
+            <a:r>
+              <a:rPr lang="en-US" altLang="zh-TW" dirty="0" smtClean="0"/>
+              <a:t>Copy a sample </a:t>
+            </a:r>
+            <a:r>
+              <a:rPr lang="en-US" altLang="zh-TW" dirty="0" err="1" smtClean="0"/>
+              <a:t>ini</a:t>
+            </a:r>
+            <a:r>
+              <a:rPr lang="en-US" altLang="zh-TW" dirty="0" smtClean="0"/>
+              <a:t> to each folder from (1)</a:t>
+            </a:r>
+          </a:p>
+          <a:p>
+            <a:pPr marL="800100" lvl="1" indent="-342900">
+              <a:buFont typeface="Arial" panose="020B0604020202020204" pitchFamily="34" charset="0"/>
+              <a:buChar char="•"/>
+            </a:pPr>
+            <a:r>
+              <a:rPr lang="en-US" altLang="zh-TW" dirty="0" smtClean="0"/>
+              <a:t>Update </a:t>
+            </a:r>
+            <a:r>
+              <a:rPr lang="en-US" altLang="zh-TW" dirty="0" err="1" smtClean="0"/>
+              <a:t>ini</a:t>
+            </a:r>
+            <a:r>
+              <a:rPr lang="en-US" altLang="zh-TW" dirty="0" smtClean="0"/>
+              <a:t> item </a:t>
+            </a:r>
+          </a:p>
+          <a:p>
+            <a:pPr marL="800100" lvl="1" indent="-342900">
+              <a:buFont typeface="Arial" panose="020B0604020202020204" pitchFamily="34" charset="0"/>
+              <a:buChar char="•"/>
+            </a:pPr>
+            <a:r>
+              <a:rPr lang="en-US" altLang="zh-TW" dirty="0"/>
+              <a:t>EX: </a:t>
+            </a:r>
+            <a:r>
+              <a:rPr lang="en-US" altLang="zh-TW" dirty="0" err="1"/>
+              <a:t>newIniValue</a:t>
+            </a:r>
+            <a:r>
+              <a:rPr lang="en-US" altLang="zh-TW" dirty="0"/>
+              <a:t> = Micron_B16A_512G</a:t>
+            </a:r>
+            <a:endParaRPr lang="zh-TW" altLang="en-US" dirty="0"/>
+          </a:p>
+        </p:txBody>
+      </p:sp>
+      <p:pic>
+        <p:nvPicPr>
+          <p:cNvPr id="5" name="圖片 4"/>
+          <p:cNvPicPr>
+            <a:picLocks noChangeAspect="1"/>
+          </p:cNvPicPr>
+          <p:nvPr/>
+        </p:nvPicPr>
+        <p:blipFill>
+          <a:blip r:embed="rId4"/>
+          <a:stretch>
+            <a:fillRect/>
+          </a:stretch>
+        </p:blipFill>
+        <p:spPr>
+          <a:xfrm>
+            <a:off x="777364" y="2608679"/>
+            <a:ext cx="1905165" cy="899238"/>
+          </a:xfrm>
+          <a:prstGeom prst="rect">
+            <a:avLst/>
+          </a:prstGeom>
+        </p:spPr>
+      </p:pic>
+      <p:graphicFrame>
+        <p:nvGraphicFramePr>
+          <p:cNvPr id="6" name="物件 5"/>
+          <p:cNvGraphicFramePr>
+            <a:graphicFrameLocks noChangeAspect="1"/>
+          </p:cNvGraphicFramePr>
+          <p:nvPr>
+            <p:extLst>
+              <p:ext uri="{D42A27DB-BD31-4B8C-83A1-F6EECF244321}">
+                <p14:modId xmlns:p14="http://schemas.microsoft.com/office/powerpoint/2010/main" val="2224100379"/>
+              </p:ext>
+            </p:extLst>
+          </p:nvPr>
+        </p:nvGraphicFramePr>
+        <p:xfrm>
+          <a:off x="9169786" y="5741344"/>
+          <a:ext cx="2074863" cy="495300"/>
+        </p:xfrm>
+        <a:graphic>
+          <a:graphicData uri="http://schemas.openxmlformats.org/presentationml/2006/ole">
+            <mc:AlternateContent xmlns:mc="http://schemas.openxmlformats.org/markup-compatibility/2006">
+              <mc:Choice xmlns:v="urn:schemas-microsoft-com:vml" Requires="v">
+                <p:oleObj spid="_x0000_s1026" name="封裝程式殼層物件" showAsIcon="1" r:id="rId5" imgW="2075040" imgH="495720" progId="Package">
+                  <p:embed/>
+                </p:oleObj>
+              </mc:Choice>
+              <mc:Fallback>
+                <p:oleObj name="封裝程式殼層物件" showAsIcon="1" r:id="rId5" imgW="2075040" imgH="495720" progId="Package">
+                  <p:embed/>
+                  <p:pic>
+                    <p:nvPicPr>
+                      <p:cNvPr id="0" name=""/>
+                      <p:cNvPicPr/>
+                      <p:nvPr/>
+                    </p:nvPicPr>
+                    <p:blipFill>
+                      <a:blip r:embed="rId6"/>
+                      <a:stretch>
+                        <a:fillRect/>
+                      </a:stretch>
+                    </p:blipFill>
+                    <p:spPr>
+                      <a:xfrm>
+                        <a:off x="9169786" y="5741344"/>
+                        <a:ext cx="2074863" cy="495300"/>
+                      </a:xfrm>
+                      <a:prstGeom prst="rect">
+                        <a:avLst/>
+                      </a:prstGeom>
+                    </p:spPr>
+                  </p:pic>
+                </p:oleObj>
+              </mc:Fallback>
+            </mc:AlternateContent>
+          </a:graphicData>
+        </a:graphic>
+      </p:graphicFrame>
+    </p:spTree>
+    <p:extLst>
+      <p:ext uri="{BB962C8B-B14F-4D97-AF65-F5344CB8AC3E}">
+        <p14:creationId xmlns:p14="http://schemas.microsoft.com/office/powerpoint/2010/main" val="465366370"/>
+      </p:ext>
+    </p:extLst>
+  </p:cSld>
+  <p:clrMapOvr>
+    <a:masterClrMapping/>
+  </p:clrMapOvr>
 </p:sld>
 </file>
 

</xml_diff>